<commit_message>
update .ppt add project setup files
</commit_message>
<xml_diff>
--- a/Tri_Training_Zhou_Li_2005.pptx
+++ b/Tri_Training_Zhou_Li_2005.pptx
@@ -3379,8 +3379,8 @@
           </a:p>
         </p:txBody>
       </p:sp>
-      <mc:AlternateContent xmlns:mc="http://schemas.openxmlformats.org/markup-compatibility/2006">
-        <mc:Choice xmlns:a14="http://schemas.microsoft.com/office/drawing/2010/main" Requires="a14">
+      <mc:AlternateContent xmlns:mc="http://schemas.openxmlformats.org/markup-compatibility/2006" xmlns:a14="http://schemas.microsoft.com/office/drawing/2010/main">
+        <mc:Choice Requires="a14">
           <p:sp>
             <p:nvSpPr>
               <p:cNvPr id="3" name="Subtitle 2">
@@ -3409,6 +3409,7 @@
               </a:bodyPr>
               <a:lstStyle/>
               <a:p>
+                <a:pPr/>
                 <a14:m>
                   <m:oMathPara xmlns:m="http://schemas.openxmlformats.org/officeDocument/2006/math">
                     <m:oMathParaPr>
@@ -3512,7 +3513,7 @@
             </p:txBody>
           </p:sp>
         </mc:Choice>
-        <mc:Fallback>
+        <mc:Fallback xmlns="">
           <p:sp>
             <p:nvSpPr>
               <p:cNvPr id="3" name="Subtitle 2">
@@ -5320,7 +5321,7 @@
             <a:pPr lvl="1"/>
             <a:r>
               <a:rPr lang="en-US" dirty="0"/>
-              <a:t>Amazon wake-word - will be presenting paper at </a:t>
+              <a:t>Amazon wake-word - presented paper at </a:t>
             </a:r>
             <a:r>
               <a:rPr lang="en-US" i="1" dirty="0"/>
@@ -5336,57 +5337,39 @@
               <a:buNone/>
             </a:pPr>
             <a:r>
-              <a:rPr lang="en-US" sz="1900" dirty="0"/>
-              <a:t>Semi-Supervised Acoustic Event Detection Based on Tri-Training, Bowen Shi, Ming Sun, </a:t>
-            </a:r>
-            <a:r>
-              <a:rPr lang="en-US" sz="1900" dirty="0" err="1">
-                <a:hlinkClick r:id="rId2"/>
-              </a:rPr>
+              <a:rPr lang="en-US" sz="1600" dirty="0"/>
+              <a:t>Shi, Bowen &amp; Sun, Ming &amp; Kao, </a:t>
+            </a:r>
+            <a:r>
+              <a:rPr lang="en-US" sz="1600" dirty="0" err="1"/>
               <a:t>Chieh</a:t>
             </a:r>
             <a:r>
-              <a:rPr lang="en-US" sz="1900" dirty="0">
-                <a:hlinkClick r:id="rId2"/>
-              </a:rPr>
-              <a:t>-Chi Kao</a:t>
-            </a:r>
-            <a:r>
-              <a:rPr lang="en-US" sz="1900" dirty="0"/>
-              <a:t>, </a:t>
-            </a:r>
-            <a:r>
-              <a:rPr lang="en-US" sz="1900" dirty="0">
-                <a:hlinkClick r:id="rId3"/>
-              </a:rPr>
-              <a:t>Viktor </a:t>
-            </a:r>
-            <a:r>
-              <a:rPr lang="en-US" sz="1900" dirty="0" err="1">
-                <a:hlinkClick r:id="rId3"/>
-              </a:rPr>
+              <a:rPr lang="en-US" sz="1600" dirty="0"/>
+              <a:t>-Chi &amp; </a:t>
+            </a:r>
+            <a:r>
+              <a:rPr lang="en-US" sz="1600" dirty="0" err="1"/>
               <a:t>Rozgic</a:t>
             </a:r>
             <a:r>
-              <a:rPr lang="en-US" sz="1900" dirty="0"/>
-              <a:t>, </a:t>
-            </a:r>
-            <a:r>
-              <a:rPr lang="en-US" sz="1900" dirty="0">
-                <a:hlinkClick r:id="rId4"/>
-              </a:rPr>
-              <a:t>Spyros </a:t>
-            </a:r>
-            <a:r>
-              <a:rPr lang="en-US" sz="1900" dirty="0" err="1">
-                <a:hlinkClick r:id="rId4"/>
-              </a:rPr>
+              <a:rPr lang="en-US" sz="1600" dirty="0"/>
+              <a:t>, Viktor &amp; </a:t>
+            </a:r>
+            <a:r>
+              <a:rPr lang="en-US" sz="1600" dirty="0" err="1"/>
               <a:t>Matsoukas</a:t>
             </a:r>
             <a:r>
-              <a:rPr lang="en-US" sz="1900" dirty="0"/>
-              <a:t>, Chao Wang</a:t>
-            </a:r>
+              <a:rPr lang="en-US" sz="1600" dirty="0"/>
+              <a:t>, Spyros &amp; Wang, Chao. (2019). Semi-supervised Acoustic Event Detection based on tri-training</a:t>
+            </a:r>
+          </a:p>
+          <a:p>
+            <a:pPr marL="457200" lvl="1" indent="0">
+              <a:buNone/>
+            </a:pPr>
+            <a:endParaRPr lang="en-US" sz="1900" dirty="0"/>
           </a:p>
         </p:txBody>
       </p:sp>
@@ -6544,8 +6527,8 @@
           <a:chExt cx="0" cy="0"/>
         </a:xfrm>
       </p:grpSpPr>
-      <mc:AlternateContent xmlns:mc="http://schemas.openxmlformats.org/markup-compatibility/2006">
-        <mc:Choice xmlns:a14="http://schemas.microsoft.com/office/drawing/2010/main" Requires="a14">
+      <mc:AlternateContent xmlns:mc="http://schemas.openxmlformats.org/markup-compatibility/2006" xmlns:a14="http://schemas.microsoft.com/office/drawing/2010/main">
+        <mc:Choice Requires="a14">
           <p:sp>
             <p:nvSpPr>
               <p:cNvPr id="2" name="Title 1">
@@ -6627,7 +6610,7 @@
             </p:txBody>
           </p:sp>
         </mc:Choice>
-        <mc:Fallback>
+        <mc:Fallback xmlns="">
           <p:sp>
             <p:nvSpPr>
               <p:cNvPr id="2" name="Title 1">

</xml_diff>